<commit_message>
homework8, new project stuff, lecture notes
</commit_message>
<xml_diff>
--- a/project/thornton-clark-popcorn.pptx
+++ b/project/thornton-clark-popcorn.pptx
@@ -12,8 +12,10 @@
     <p:sldId id="258" r:id="rId6"/>
     <p:sldId id="257" r:id="rId7"/>
     <p:sldId id="264" r:id="rId8"/>
-    <p:sldId id="261" r:id="rId9"/>
-    <p:sldId id="260" r:id="rId10"/>
+    <p:sldId id="265" r:id="rId9"/>
+    <p:sldId id="266" r:id="rId10"/>
+    <p:sldId id="261" r:id="rId11"/>
+    <p:sldId id="260" r:id="rId12"/>
   </p:sldIdLst>
   <p:sldSz cx="9144000" cy="6858000" type="screen4x3"/>
   <p:notesSz cx="6858000" cy="9144000"/>
@@ -297,7 +299,7 @@
             <a:fld id="{50C0A67D-3799-6D49-B3EF-E582EBC7730D}" type="datetimeFigureOut">
               <a:rPr lang="en-US" smtClean="0"/>
               <a:pPr/>
-              <a:t>4/25/16</a:t>
+              <a:t>4/26/16</a:t>
             </a:fld>
             <a:endParaRPr lang="en-US"/>
           </a:p>
@@ -464,7 +466,7 @@
             <a:fld id="{50C0A67D-3799-6D49-B3EF-E582EBC7730D}" type="datetimeFigureOut">
               <a:rPr lang="en-US" smtClean="0"/>
               <a:pPr/>
-              <a:t>4/25/16</a:t>
+              <a:t>4/26/16</a:t>
             </a:fld>
             <a:endParaRPr lang="en-US"/>
           </a:p>
@@ -641,7 +643,7 @@
             <a:fld id="{50C0A67D-3799-6D49-B3EF-E582EBC7730D}" type="datetimeFigureOut">
               <a:rPr lang="en-US" smtClean="0"/>
               <a:pPr/>
-              <a:t>4/25/16</a:t>
+              <a:t>4/26/16</a:t>
             </a:fld>
             <a:endParaRPr lang="en-US"/>
           </a:p>
@@ -808,7 +810,7 @@
             <a:fld id="{50C0A67D-3799-6D49-B3EF-E582EBC7730D}" type="datetimeFigureOut">
               <a:rPr lang="en-US" smtClean="0"/>
               <a:pPr/>
-              <a:t>4/25/16</a:t>
+              <a:t>4/26/16</a:t>
             </a:fld>
             <a:endParaRPr lang="en-US"/>
           </a:p>
@@ -1051,7 +1053,7 @@
             <a:fld id="{50C0A67D-3799-6D49-B3EF-E582EBC7730D}" type="datetimeFigureOut">
               <a:rPr lang="en-US" smtClean="0"/>
               <a:pPr/>
-              <a:t>4/25/16</a:t>
+              <a:t>4/26/16</a:t>
             </a:fld>
             <a:endParaRPr lang="en-US"/>
           </a:p>
@@ -1336,7 +1338,7 @@
             <a:fld id="{50C0A67D-3799-6D49-B3EF-E582EBC7730D}" type="datetimeFigureOut">
               <a:rPr lang="en-US" smtClean="0"/>
               <a:pPr/>
-              <a:t>4/25/16</a:t>
+              <a:t>4/26/16</a:t>
             </a:fld>
             <a:endParaRPr lang="en-US"/>
           </a:p>
@@ -1755,7 +1757,7 @@
             <a:fld id="{50C0A67D-3799-6D49-B3EF-E582EBC7730D}" type="datetimeFigureOut">
               <a:rPr lang="en-US" smtClean="0"/>
               <a:pPr/>
-              <a:t>4/25/16</a:t>
+              <a:t>4/26/16</a:t>
             </a:fld>
             <a:endParaRPr lang="en-US"/>
           </a:p>
@@ -1870,7 +1872,7 @@
             <a:fld id="{50C0A67D-3799-6D49-B3EF-E582EBC7730D}" type="datetimeFigureOut">
               <a:rPr lang="en-US" smtClean="0"/>
               <a:pPr/>
-              <a:t>4/25/16</a:t>
+              <a:t>4/26/16</a:t>
             </a:fld>
             <a:endParaRPr lang="en-US"/>
           </a:p>
@@ -1962,7 +1964,7 @@
             <a:fld id="{50C0A67D-3799-6D49-B3EF-E582EBC7730D}" type="datetimeFigureOut">
               <a:rPr lang="en-US" smtClean="0"/>
               <a:pPr/>
-              <a:t>4/25/16</a:t>
+              <a:t>4/26/16</a:t>
             </a:fld>
             <a:endParaRPr lang="en-US"/>
           </a:p>
@@ -2236,7 +2238,7 @@
             <a:fld id="{50C0A67D-3799-6D49-B3EF-E582EBC7730D}" type="datetimeFigureOut">
               <a:rPr lang="en-US" smtClean="0"/>
               <a:pPr/>
-              <a:t>4/25/16</a:t>
+              <a:t>4/26/16</a:t>
             </a:fld>
             <a:endParaRPr lang="en-US"/>
           </a:p>
@@ -2486,7 +2488,7 @@
             <a:fld id="{50C0A67D-3799-6D49-B3EF-E582EBC7730D}" type="datetimeFigureOut">
               <a:rPr lang="en-US" smtClean="0"/>
               <a:pPr/>
-              <a:t>4/25/16</a:t>
+              <a:t>4/26/16</a:t>
             </a:fld>
             <a:endParaRPr lang="en-US"/>
           </a:p>
@@ -2696,7 +2698,7 @@
             <a:fld id="{50C0A67D-3799-6D49-B3EF-E582EBC7730D}" type="datetimeFigureOut">
               <a:rPr lang="en-US" smtClean="0"/>
               <a:pPr/>
-              <a:t>4/25/16</a:t>
+              <a:t>4/26/16</a:t>
             </a:fld>
             <a:endParaRPr lang="en-US"/>
           </a:p>
@@ -3077,16 +3079,21 @@
             <p:ph type="ctrTitle"/>
           </p:nvPr>
         </p:nvSpPr>
-        <p:spPr/>
-        <p:txBody>
-          <a:bodyPr/>
-          <a:lstStyle/>
-          <a:p>
-            <a:r>
-              <a:rPr lang="en-US" dirty="0" smtClean="0"/>
-              <a:t>Popcorn</a:t>
-            </a:r>
-            <a:endParaRPr lang="en-US" dirty="0"/>
+        <p:spPr>
+          <a:xfrm>
+            <a:off x="685800" y="2362200"/>
+            <a:ext cx="7772400" cy="1470025"/>
+          </a:xfrm>
+        </p:spPr>
+        <p:txBody>
+          <a:bodyPr/>
+          <a:lstStyle/>
+          <a:p>
+            <a:r>
+              <a:rPr lang="en-US" i="1" dirty="0" smtClean="0"/>
+              <a:t>Microwave Popcorn</a:t>
+            </a:r>
+            <a:endParaRPr lang="en-US" i="1" dirty="0"/>
           </a:p>
         </p:txBody>
       </p:sp>
@@ -3100,7 +3107,12 @@
             <p:ph type="subTitle" idx="1"/>
           </p:nvPr>
         </p:nvSpPr>
-        <p:spPr/>
+        <p:spPr>
+          <a:xfrm>
+            <a:off x="1371600" y="4648200"/>
+            <a:ext cx="6400800" cy="1752600"/>
+          </a:xfrm>
+        </p:spPr>
         <p:txBody>
           <a:bodyPr/>
           <a:lstStyle/>
@@ -3129,6 +3141,230 @@
               <a:rPr lang="en-US" dirty="0" smtClean="0"/>
               <a:t>-Clark</a:t>
             </a:r>
+          </a:p>
+        </p:txBody>
+      </p:sp>
+      <p:pic>
+        <p:nvPicPr>
+          <p:cNvPr id="5" name="Picture 4" descr="ci_logo-45a53602a81929fb632c669f9ff14f53.png"/>
+          <p:cNvPicPr>
+            <a:picLocks noChangeAspect="1"/>
+          </p:cNvPicPr>
+          <p:nvPr/>
+        </p:nvPicPr>
+        <p:blipFill>
+          <a:blip r:embed="rId2"/>
+          <a:stretch>
+            <a:fillRect/>
+          </a:stretch>
+        </p:blipFill>
+        <p:spPr>
+          <a:xfrm>
+            <a:off x="838200" y="457200"/>
+            <a:ext cx="7625750" cy="1981200"/>
+          </a:xfrm>
+          <a:prstGeom prst="rect">
+            <a:avLst/>
+          </a:prstGeom>
+        </p:spPr>
+      </p:pic>
+    </p:spTree>
+  </p:cSld>
+  <p:clrMapOvr>
+    <a:masterClrMapping/>
+  </p:clrMapOvr>
+</p:sld>
+</file>
+
+<file path=ppt/slides/slide10.xml><?xml version="1.0" encoding="utf-8"?>
+<p:sld xmlns:a="http://schemas.openxmlformats.org/drawingml/2006/main" xmlns:r="http://schemas.openxmlformats.org/officeDocument/2006/relationships" xmlns:mc="http://schemas.openxmlformats.org/markup-compatibility/2006" xmlns:mv="urn:schemas-microsoft-com:mac:vml" xmlns:p="http://schemas.openxmlformats.org/presentationml/2006/main" mc:Ignorable="mv" mc:PreserveAttributes="mv:*">
+  <p:cSld>
+    <p:spTree>
+      <p:nvGrpSpPr>
+        <p:cNvPr id="1" name=""/>
+        <p:cNvGrpSpPr/>
+        <p:nvPr/>
+      </p:nvGrpSpPr>
+      <p:grpSpPr>
+        <a:xfrm>
+          <a:off x="0" y="0"/>
+          <a:ext cx="0" cy="0"/>
+          <a:chOff x="0" y="0"/>
+          <a:chExt cx="0" cy="0"/>
+        </a:xfrm>
+      </p:grpSpPr>
+      <p:sp>
+        <p:nvSpPr>
+          <p:cNvPr id="2" name="Title 1"/>
+          <p:cNvSpPr>
+            <a:spLocks noGrp="1"/>
+          </p:cNvSpPr>
+          <p:nvPr>
+            <p:ph type="title"/>
+          </p:nvPr>
+        </p:nvSpPr>
+        <p:spPr/>
+        <p:txBody>
+          <a:bodyPr/>
+          <a:lstStyle/>
+          <a:p>
+            <a:r>
+              <a:rPr lang="en-US" dirty="0" smtClean="0"/>
+              <a:t>Conclusions</a:t>
+            </a:r>
+            <a:endParaRPr lang="en-US" dirty="0"/>
+          </a:p>
+        </p:txBody>
+      </p:sp>
+      <p:sp>
+        <p:nvSpPr>
+          <p:cNvPr id="3" name="Content Placeholder 2"/>
+          <p:cNvSpPr>
+            <a:spLocks noGrp="1"/>
+          </p:cNvSpPr>
+          <p:nvPr>
+            <p:ph idx="1"/>
+          </p:nvPr>
+        </p:nvSpPr>
+        <p:spPr/>
+        <p:txBody>
+          <a:bodyPr/>
+          <a:lstStyle/>
+          <a:p>
+            <a:r>
+              <a:rPr lang="en-US" dirty="0" smtClean="0"/>
+              <a:t>Fat didn’t make a difference (not expected)</a:t>
+            </a:r>
+          </a:p>
+          <a:p>
+            <a:r>
+              <a:rPr lang="en-US" dirty="0" smtClean="0"/>
+              <a:t>MOAR </a:t>
+            </a:r>
+            <a:r>
+              <a:rPr lang="en-US" dirty="0" smtClean="0"/>
+              <a:t>POWR == MOAR </a:t>
+            </a:r>
+            <a:r>
+              <a:rPr lang="en-US" dirty="0" smtClean="0"/>
+              <a:t>KORN (expected)</a:t>
+            </a:r>
+          </a:p>
+          <a:p>
+            <a:r>
+              <a:rPr lang="en-US" dirty="0" smtClean="0"/>
+              <a:t>Extremely large differences in microwaves</a:t>
+            </a:r>
+            <a:endParaRPr lang="en-US" dirty="0"/>
+          </a:p>
+        </p:txBody>
+      </p:sp>
+    </p:spTree>
+  </p:cSld>
+  <p:clrMapOvr>
+    <a:masterClrMapping/>
+  </p:clrMapOvr>
+</p:sld>
+</file>
+
+<file path=ppt/slides/slide11.xml><?xml version="1.0" encoding="utf-8"?>
+<p:sld xmlns:a="http://schemas.openxmlformats.org/drawingml/2006/main" xmlns:r="http://schemas.openxmlformats.org/officeDocument/2006/relationships" xmlns:mc="http://schemas.openxmlformats.org/markup-compatibility/2006" xmlns:mv="urn:schemas-microsoft-com:mac:vml" xmlns:p="http://schemas.openxmlformats.org/presentationml/2006/main" mc:Ignorable="mv" mc:PreserveAttributes="mv:*">
+  <p:cSld>
+    <p:spTree>
+      <p:nvGrpSpPr>
+        <p:cNvPr id="1" name=""/>
+        <p:cNvGrpSpPr/>
+        <p:nvPr/>
+      </p:nvGrpSpPr>
+      <p:grpSpPr>
+        <a:xfrm>
+          <a:off x="0" y="0"/>
+          <a:ext cx="0" cy="0"/>
+          <a:chOff x="0" y="0"/>
+          <a:chExt cx="0" cy="0"/>
+        </a:xfrm>
+      </p:grpSpPr>
+      <p:sp>
+        <p:nvSpPr>
+          <p:cNvPr id="2" name="Title 1"/>
+          <p:cNvSpPr>
+            <a:spLocks noGrp="1"/>
+          </p:cNvSpPr>
+          <p:nvPr>
+            <p:ph type="title"/>
+          </p:nvPr>
+        </p:nvSpPr>
+        <p:spPr/>
+        <p:txBody>
+          <a:bodyPr/>
+          <a:lstStyle/>
+          <a:p>
+            <a:r>
+              <a:rPr lang="en-US" dirty="0" smtClean="0"/>
+              <a:t>Recommendations</a:t>
+            </a:r>
+            <a:endParaRPr lang="en-US" dirty="0"/>
+          </a:p>
+        </p:txBody>
+      </p:sp>
+      <p:sp>
+        <p:nvSpPr>
+          <p:cNvPr id="3" name="Content Placeholder 2"/>
+          <p:cNvSpPr>
+            <a:spLocks noGrp="1"/>
+          </p:cNvSpPr>
+          <p:nvPr>
+            <p:ph idx="1"/>
+          </p:nvPr>
+        </p:nvSpPr>
+        <p:spPr/>
+        <p:txBody>
+          <a:bodyPr/>
+          <a:lstStyle/>
+          <a:p>
+            <a:r>
+              <a:rPr lang="en-US" dirty="0" smtClean="0"/>
+              <a:t>¼ </a:t>
+            </a:r>
+            <a:r>
+              <a:rPr lang="en-US" dirty="0" smtClean="0"/>
+              <a:t>cup kernels</a:t>
+            </a:r>
+          </a:p>
+          <a:p>
+            <a:r>
+              <a:rPr lang="en-US" dirty="0" smtClean="0"/>
+              <a:t>paper bag</a:t>
+            </a:r>
+          </a:p>
+          <a:p>
+            <a:r>
+              <a:rPr lang="en-US" dirty="0" smtClean="0"/>
+              <a:t>1 tbsp </a:t>
+            </a:r>
+            <a:r>
+              <a:rPr lang="en-US" dirty="0" smtClean="0"/>
+              <a:t>fat for flavor* (optional), salt</a:t>
+            </a:r>
+          </a:p>
+          <a:p>
+            <a:r>
+              <a:rPr lang="en-US" dirty="0" smtClean="0"/>
+              <a:t>~1.5 minutes on high (until popping stops)</a:t>
+            </a:r>
+          </a:p>
+          <a:p>
+            <a:endParaRPr lang="en-US" dirty="0" smtClean="0"/>
+          </a:p>
+          <a:p>
+            <a:pPr>
+              <a:buNone/>
+            </a:pPr>
+            <a:r>
+              <a:rPr lang="en-US" dirty="0" smtClean="0"/>
+              <a:t>* be careful not to burn butter</a:t>
+            </a:r>
+            <a:endParaRPr lang="en-US" dirty="0"/>
           </a:p>
         </p:txBody>
       </p:sp>
@@ -3197,7 +3433,7 @@
           <a:p>
             <a:r>
               <a:rPr lang="en-US" dirty="0" smtClean="0"/>
-              <a:t>Factorial</a:t>
+              <a:t>RCBD</a:t>
             </a:r>
             <a:endParaRPr lang="en-US" dirty="0"/>
           </a:p>
@@ -3268,9 +3504,29 @@
           <a:p>
             <a:r>
               <a:rPr lang="en-US" dirty="0" smtClean="0"/>
-              <a:t>Age, power, turntable</a:t>
-            </a:r>
-            <a:endParaRPr lang="en-US" dirty="0"/>
+              <a:t>1200W was </a:t>
+            </a:r>
+            <a:r>
+              <a:rPr lang="en-US" dirty="0" smtClean="0"/>
+              <a:t>~1yo; newest, highest power, best performance</a:t>
+            </a:r>
+          </a:p>
+          <a:p>
+            <a:r>
+              <a:rPr lang="en-US" dirty="0" smtClean="0"/>
+              <a:t>Older, less powerful had much worse outcomes</a:t>
+            </a:r>
+          </a:p>
+          <a:p>
+            <a:r>
+              <a:rPr lang="en-US" dirty="0" smtClean="0"/>
+              <a:t>All </a:t>
+            </a:r>
+            <a:r>
+              <a:rPr lang="en-US" dirty="0" smtClean="0"/>
+              <a:t>ovens used a turntable</a:t>
+            </a:r>
+            <a:endParaRPr lang="en-US" dirty="0" smtClean="0"/>
           </a:p>
         </p:txBody>
       </p:sp>
@@ -3339,7 +3595,17 @@
           <a:p>
             <a:r>
               <a:rPr lang="en-US" dirty="0" smtClean="0"/>
-              <a:t>Differences in ¼ cup ~ 400 kernels</a:t>
+              <a:t>Differences in ¼ cup ~ 400 </a:t>
+            </a:r>
+            <a:r>
+              <a:rPr lang="en-US" dirty="0" smtClean="0"/>
+              <a:t>kernels</a:t>
+            </a:r>
+          </a:p>
+          <a:p>
+            <a:r>
+              <a:rPr lang="en-US" dirty="0" smtClean="0"/>
+              <a:t>Do older ovens work properly/can we trust wattage?</a:t>
             </a:r>
             <a:endParaRPr lang="en-US" dirty="0"/>
           </a:p>
@@ -3850,35 +4116,36 @@
           <a:p>
             <a:r>
               <a:rPr lang="en-US" dirty="0" smtClean="0"/>
-              <a:t>Conclusions</a:t>
+              <a:t>Normality</a:t>
             </a:r>
             <a:endParaRPr lang="en-US" dirty="0"/>
           </a:p>
         </p:txBody>
       </p:sp>
-      <p:sp>
-        <p:nvSpPr>
-          <p:cNvPr id="3" name="Content Placeholder 2"/>
-          <p:cNvSpPr>
-            <a:spLocks noGrp="1"/>
-          </p:cNvSpPr>
-          <p:nvPr>
-            <p:ph idx="1"/>
-          </p:nvPr>
-        </p:nvSpPr>
-        <p:spPr/>
-        <p:txBody>
-          <a:bodyPr/>
-          <a:lstStyle/>
-          <a:p>
-            <a:r>
-              <a:rPr lang="en-US" dirty="0" smtClean="0"/>
-              <a:t>MOAR POWR == MOAR KORN</a:t>
-            </a:r>
-            <a:endParaRPr lang="en-US" dirty="0"/>
-          </a:p>
-        </p:txBody>
-      </p:sp>
+      <p:pic>
+        <p:nvPicPr>
+          <p:cNvPr id="4" name="Picture 3" descr="normal.png"/>
+          <p:cNvPicPr>
+            <a:picLocks noChangeAspect="1"/>
+          </p:cNvPicPr>
+          <p:nvPr/>
+        </p:nvPicPr>
+        <p:blipFill>
+          <a:blip r:embed="rId2"/>
+          <a:stretch>
+            <a:fillRect/>
+          </a:stretch>
+        </p:blipFill>
+        <p:spPr>
+          <a:xfrm>
+            <a:off x="0" y="1295400"/>
+            <a:ext cx="9144000" cy="5642043"/>
+          </a:xfrm>
+          <a:prstGeom prst="rect">
+            <a:avLst/>
+          </a:prstGeom>
+        </p:spPr>
+      </p:pic>
     </p:spTree>
   </p:cSld>
   <p:clrMapOvr>
@@ -3904,48 +4171,30 @@
           <a:chExt cx="0" cy="0"/>
         </a:xfrm>
       </p:grpSpPr>
-      <p:sp>
-        <p:nvSpPr>
-          <p:cNvPr id="2" name="Title 1"/>
-          <p:cNvSpPr>
-            <a:spLocks noGrp="1"/>
-          </p:cNvSpPr>
-          <p:nvPr>
-            <p:ph type="title"/>
-          </p:nvPr>
-        </p:nvSpPr>
-        <p:spPr/>
-        <p:txBody>
-          <a:bodyPr/>
-          <a:lstStyle/>
-          <a:p>
-            <a:r>
-              <a:rPr lang="en-US" dirty="0" smtClean="0"/>
-              <a:t>Recommendations</a:t>
-            </a:r>
-            <a:endParaRPr lang="en-US" dirty="0"/>
-          </a:p>
-        </p:txBody>
-      </p:sp>
-      <p:sp>
-        <p:nvSpPr>
-          <p:cNvPr id="3" name="Content Placeholder 2"/>
-          <p:cNvSpPr>
-            <a:spLocks noGrp="1"/>
-          </p:cNvSpPr>
-          <p:nvPr>
-            <p:ph idx="1"/>
-          </p:nvPr>
-        </p:nvSpPr>
-        <p:spPr/>
-        <p:txBody>
-          <a:bodyPr/>
-          <a:lstStyle/>
-          <a:p>
-            <a:endParaRPr lang="en-US"/>
-          </a:p>
-        </p:txBody>
-      </p:sp>
+      <p:pic>
+        <p:nvPicPr>
+          <p:cNvPr id="4" name="Picture 3" descr="boxplots.png"/>
+          <p:cNvPicPr>
+            <a:picLocks noChangeAspect="1"/>
+          </p:cNvPicPr>
+          <p:nvPr/>
+        </p:nvPicPr>
+        <p:blipFill>
+          <a:blip r:embed="rId2"/>
+          <a:stretch>
+            <a:fillRect/>
+          </a:stretch>
+        </p:blipFill>
+        <p:spPr>
+          <a:xfrm>
+            <a:off x="0" y="607978"/>
+            <a:ext cx="9144000" cy="5642043"/>
+          </a:xfrm>
+          <a:prstGeom prst="rect">
+            <a:avLst/>
+          </a:prstGeom>
+        </p:spPr>
+      </p:pic>
     </p:spTree>
   </p:cSld>
   <p:clrMapOvr>

</xml_diff>